<commit_message>
Fixed typos in text and figures
</commit_message>
<xml_diff>
--- a/textbook/chap6_camera_features/figures/figures.pptx
+++ b/textbook/chap6_camera_features/figures/figures.pptx
@@ -8279,7 +8279,7 @@
         </p:blipFill>
         <p:spPr>
           <a:xfrm>
-            <a:off x="4391385" y="3932553"/>
+            <a:off x="3184651" y="2870524"/>
             <a:ext cx="1110488" cy="277622"/>
           </a:xfrm>
           <a:prstGeom prst="rect">
@@ -8309,7 +8309,7 @@
         </p:blipFill>
         <p:spPr>
           <a:xfrm>
-            <a:off x="3166110" y="2906451"/>
+            <a:off x="4373230" y="3952482"/>
             <a:ext cx="1112520" cy="289719"/>
           </a:xfrm>
           <a:prstGeom prst="rect">

</xml_diff>